<commit_message>
Update Traffic Camera Browser.pptx
</commit_message>
<xml_diff>
--- a/Analysis/DomainModel/Traffic Camera Browser.pptx
+++ b/Analysis/DomainModel/Traffic Camera Browser.pptx
@@ -31547,7 +31547,7 @@
       </p:sp>
       <p:pic>
         <p:nvPicPr>
-          <p:cNvPr id="326" name="Google Shape;326;p53" title="DomainModel.png"/>
+          <p:cNvPr id="326" name="Google Shape;326;p53"/>
           <p:cNvPicPr preferRelativeResize="0"/>
           <p:nvPr/>
         </p:nvPicPr>
@@ -31561,8 +31561,8 @@
         </p:blipFill>
         <p:spPr>
           <a:xfrm>
-            <a:off x="152400" y="1155363"/>
-            <a:ext cx="8839201" cy="2832765"/>
+            <a:off x="152400" y="857825"/>
+            <a:ext cx="8839201" cy="3427853"/>
           </a:xfrm>
           <a:prstGeom prst="rect">
             <a:avLst/>
@@ -32723,9 +32723,9 @@
 </file>
 
 <file path=ppt/theme/theme1.xml><?xml version="1.0" encoding="utf-8"?>
-<a:theme xmlns:a="http://schemas.openxmlformats.org/drawingml/2006/main" xmlns:r="http://schemas.openxmlformats.org/officeDocument/2006/relationships" name="Simple Light">
+<a:theme xmlns:a="http://schemas.openxmlformats.org/drawingml/2006/main" xmlns:r="http://schemas.openxmlformats.org/officeDocument/2006/relationships">
   <a:themeElements>
-    <a:clrScheme name="Simple Light">
+    <a:clrScheme name="Default">
       <a:dk1>
         <a:srgbClr val="000000"/>
       </a:dk1>
@@ -32733,34 +32733,34 @@
         <a:srgbClr val="FFFFFF"/>
       </a:lt1>
       <a:dk2>
-        <a:srgbClr val="595959"/>
+        <a:srgbClr val="158158"/>
       </a:dk2>
       <a:lt2>
-        <a:srgbClr val="EEEEEE"/>
+        <a:srgbClr val="F3F3F3"/>
       </a:lt2>
       <a:accent1>
-        <a:srgbClr val="4285F4"/>
+        <a:srgbClr val="058DC7"/>
       </a:accent1>
       <a:accent2>
-        <a:srgbClr val="212121"/>
+        <a:srgbClr val="50B432"/>
       </a:accent2>
       <a:accent3>
-        <a:srgbClr val="78909C"/>
+        <a:srgbClr val="ED561B"/>
       </a:accent3>
       <a:accent4>
-        <a:srgbClr val="FFAB40"/>
+        <a:srgbClr val="EDEF00"/>
       </a:accent4>
       <a:accent5>
-        <a:srgbClr val="0097A7"/>
+        <a:srgbClr val="24CBE5"/>
       </a:accent5>
       <a:accent6>
-        <a:srgbClr val="EEFF41"/>
+        <a:srgbClr val="64E572"/>
       </a:accent6>
       <a:hlink>
-        <a:srgbClr val="0097A7"/>
+        <a:srgbClr val="2200CC"/>
       </a:hlink>
       <a:folHlink>
-        <a:srgbClr val="0097A7"/>
+        <a:srgbClr val="551A8B"/>
       </a:folHlink>
     </a:clrScheme>
     <a:fontScheme name="Office">
@@ -33002,9 +33002,9 @@
 </file>
 
 <file path=ppt/theme/theme2.xml><?xml version="1.0" encoding="utf-8"?>
-<a:theme xmlns:a="http://schemas.openxmlformats.org/drawingml/2006/main" xmlns:r="http://schemas.openxmlformats.org/officeDocument/2006/relationships">
+<a:theme xmlns:a="http://schemas.openxmlformats.org/drawingml/2006/main" xmlns:r="http://schemas.openxmlformats.org/officeDocument/2006/relationships" name="Simple Light">
   <a:themeElements>
-    <a:clrScheme name="Default">
+    <a:clrScheme name="Simple Light">
       <a:dk1>
         <a:srgbClr val="000000"/>
       </a:dk1>
@@ -33012,34 +33012,34 @@
         <a:srgbClr val="FFFFFF"/>
       </a:lt1>
       <a:dk2>
-        <a:srgbClr val="158158"/>
+        <a:srgbClr val="595959"/>
       </a:dk2>
       <a:lt2>
-        <a:srgbClr val="F3F3F3"/>
+        <a:srgbClr val="EEEEEE"/>
       </a:lt2>
       <a:accent1>
-        <a:srgbClr val="058DC7"/>
+        <a:srgbClr val="4285F4"/>
       </a:accent1>
       <a:accent2>
-        <a:srgbClr val="50B432"/>
+        <a:srgbClr val="212121"/>
       </a:accent2>
       <a:accent3>
-        <a:srgbClr val="ED561B"/>
+        <a:srgbClr val="78909C"/>
       </a:accent3>
       <a:accent4>
-        <a:srgbClr val="EDEF00"/>
+        <a:srgbClr val="FFAB40"/>
       </a:accent4>
       <a:accent5>
-        <a:srgbClr val="24CBE5"/>
+        <a:srgbClr val="0097A7"/>
       </a:accent5>
       <a:accent6>
-        <a:srgbClr val="64E572"/>
+        <a:srgbClr val="EEFF41"/>
       </a:accent6>
       <a:hlink>
-        <a:srgbClr val="2200CC"/>
+        <a:srgbClr val="0097A7"/>
       </a:hlink>
       <a:folHlink>
-        <a:srgbClr val="551A8B"/>
+        <a:srgbClr val="0097A7"/>
       </a:folHlink>
     </a:clrScheme>
     <a:fontScheme name="Office">

</xml_diff>